<commit_message>
added content on ppt
</commit_message>
<xml_diff>
--- a/chorusPPT.pptx
+++ b/chorusPPT.pptx
@@ -3697,25 +3697,58 @@
           </a:p>
         </p:txBody>
       </p:sp>
-      <p:sp>
-        <p:nvSpPr>
-          <p:cNvPr id="3" name="Content Placeholder 2"/>
-          <p:cNvSpPr>
-            <a:spLocks noGrp="1"/>
-          </p:cNvSpPr>
+      <p:pic>
+        <p:nvPicPr>
+          <p:cNvPr id="4" name="Content Placeholder 3"/>
+          <p:cNvPicPr>
+            <a:picLocks noGrp="1" noChangeAspect="1"/>
+          </p:cNvPicPr>
           <p:nvPr>
             <p:ph idx="1"/>
           </p:nvPr>
-        </p:nvSpPr>
-        <p:spPr/>
-        <p:txBody>
-          <a:bodyPr/>
-          <a:lstStyle/>
-          <a:p>
-            <a:endParaRPr lang="en-US"/>
-          </a:p>
-        </p:txBody>
-      </p:sp>
+        </p:nvPicPr>
+        <p:blipFill rotWithShape="1">
+          <a:blip r:embed="rId2">
+            <a:alphaModFix/>
+            <a:extLst>
+              <a:ext uri="{BEBA8EAE-BF5A-486C-A8C5-ECC9F3942E4B}">
+                <a14:imgProps xmlns:a14="http://schemas.microsoft.com/office/drawing/2010/main">
+                  <a14:imgLayer r:embed="rId3">
+                    <a14:imgEffect>
+                      <a14:sharpenSoften amount="50000"/>
+                    </a14:imgEffect>
+                  </a14:imgLayer>
+                </a14:imgProps>
+              </a:ext>
+              <a:ext uri="{28A0092B-C50C-407E-A947-70E740481C1C}">
+                <a14:useLocalDpi xmlns:a14="http://schemas.microsoft.com/office/drawing/2010/main" val="0"/>
+              </a:ext>
+            </a:extLst>
+          </a:blip>
+          <a:srcRect l="1748" t="7854"/>
+          <a:stretch/>
+        </p:blipFill>
+        <p:spPr>
+          <a:xfrm>
+            <a:off x="1664434" y="2547258"/>
+            <a:ext cx="9177564" cy="2490329"/>
+          </a:xfrm>
+          <a:ln>
+            <a:solidFill>
+              <a:schemeClr val="tx1"/>
+            </a:solidFill>
+          </a:ln>
+          <a:effectLst>
+            <a:glow rad="63500">
+              <a:schemeClr val="accent1">
+                <a:alpha val="40000"/>
+              </a:schemeClr>
+            </a:glow>
+            <a:reflection endPos="3000" dist="50800" dir="5400000" sy="-100000" algn="bl" rotWithShape="0"/>
+            <a:softEdge rad="114300"/>
+          </a:effectLst>
+        </p:spPr>
+      </p:pic>
     </p:spTree>
     <p:extLst>
       <p:ext uri="{BB962C8B-B14F-4D97-AF65-F5344CB8AC3E}">
@@ -3833,7 +3866,11 @@
           <a:bodyPr/>
           <a:lstStyle/>
           <a:p>
-            <a:endParaRPr lang="en-US"/>
+            <a:r>
+              <a:rPr lang="en-US" dirty="0" smtClean="0"/>
+              <a:t>Future plans</a:t>
+            </a:r>
+            <a:endParaRPr lang="en-US" dirty="0"/>
           </a:p>
         </p:txBody>
       </p:sp>

</xml_diff>

<commit_message>
content added to ppt
</commit_message>
<xml_diff>
--- a/chorusPPT.pptx
+++ b/chorusPPT.pptx
@@ -109,6 +109,11 @@
       </a:defRPr>
     </a:lvl9pPr>
   </p:defaultTextStyle>
+  <p:extLst>
+    <p:ext uri="{EFAFB233-063F-42B5-8137-9DF3F51BA10A}">
+      <p15:sldGuideLst xmlns:p15="http://schemas.microsoft.com/office/powerpoint/2012/main"/>
+    </p:ext>
+  </p:extLst>
 </p:presentation>
 </file>
 
@@ -3938,29 +3943,47 @@
           <a:bodyPr/>
           <a:lstStyle/>
           <a:p>
-            <a:endParaRPr lang="en-US"/>
-          </a:p>
-        </p:txBody>
-      </p:sp>
-      <p:sp>
-        <p:nvSpPr>
-          <p:cNvPr id="3" name="Content Placeholder 2"/>
-          <p:cNvSpPr>
-            <a:spLocks noGrp="1"/>
-          </p:cNvSpPr>
+            <a:r>
+              <a:rPr lang="en-US" dirty="0" smtClean="0"/>
+              <a:t>Thanks To</a:t>
+            </a:r>
+            <a:r>
+              <a:rPr lang="is-IS" dirty="0" smtClean="0"/>
+              <a:t>…</a:t>
+            </a:r>
+            <a:endParaRPr lang="en-US" dirty="0"/>
+          </a:p>
+        </p:txBody>
+      </p:sp>
+      <p:pic>
+        <p:nvPicPr>
+          <p:cNvPr id="4" name="Content Placeholder 3"/>
+          <p:cNvPicPr>
+            <a:picLocks noGrp="1" noChangeAspect="1"/>
+          </p:cNvPicPr>
           <p:nvPr>
             <p:ph idx="1"/>
           </p:nvPr>
-        </p:nvSpPr>
-        <p:spPr/>
-        <p:txBody>
-          <a:bodyPr/>
-          <a:lstStyle/>
-          <a:p>
-            <a:endParaRPr lang="en-US"/>
-          </a:p>
-        </p:txBody>
-      </p:sp>
+        </p:nvPicPr>
+        <p:blipFill>
+          <a:blip r:embed="rId2">
+            <a:extLst>
+              <a:ext uri="{28A0092B-C50C-407E-A947-70E740481C1C}">
+                <a14:useLocalDpi xmlns:a14="http://schemas.microsoft.com/office/drawing/2010/main" val="0"/>
+              </a:ext>
+            </a:extLst>
+          </a:blip>
+          <a:stretch>
+            <a:fillRect/>
+          </a:stretch>
+        </p:blipFill>
+        <p:spPr>
+          <a:xfrm>
+            <a:off x="5027612" y="2515394"/>
+            <a:ext cx="2451100" cy="2451100"/>
+          </a:xfrm>
+        </p:spPr>
+      </p:pic>
     </p:spTree>
     <p:extLst>
       <p:ext uri="{BB962C8B-B14F-4D97-AF65-F5344CB8AC3E}">

</xml_diff>